<commit_message>
change center names and add not included expandable boxes.
</commit_message>
<xml_diff>
--- a/app/public/css/img/legend.pptx
+++ b/app/public/css/img/legend.pptx
@@ -5,11 +5,12 @@
     <p:sldMasterId id="2147483648" r:id="rId1"/>
   </p:sldMasterIdLst>
   <p:notesMasterIdLst>
-    <p:notesMasterId r:id="rId4"/>
+    <p:notesMasterId r:id="rId5"/>
   </p:notesMasterIdLst>
   <p:sldIdLst>
     <p:sldId id="256" r:id="rId2"/>
-    <p:sldId id="257" r:id="rId3"/>
+    <p:sldId id="258" r:id="rId3"/>
+    <p:sldId id="257" r:id="rId4"/>
   </p:sldIdLst>
   <p:sldSz cx="9144000" cy="6858000" type="screen4x3"/>
   <p:notesSz cx="6858000" cy="9144000"/>
@@ -193,7 +194,8 @@
           <a:p>
             <a:fld id="{BB031649-C5D4-4975-9118-257A744452E7}" type="datetimeFigureOut">
               <a:rPr lang="en-US" smtClean="0"/>
-              <a:t>4/2/2015</a:t>
+              <a:pPr/>
+              <a:t>4/9/2015</a:t>
             </a:fld>
             <a:endParaRPr lang="en-US"/>
           </a:p>
@@ -354,6 +356,7 @@
           <a:p>
             <a:fld id="{0912983F-8562-4131-A204-9294D774AF33}" type="slidenum">
               <a:rPr lang="en-US" smtClean="0"/>
+              <a:pPr/>
               <a:t>‹#›</a:t>
             </a:fld>
             <a:endParaRPr lang="en-US"/>
@@ -561,6 +564,7 @@
           <a:p>
             <a:fld id="{0912983F-8562-4131-A204-9294D774AF33}" type="slidenum">
               <a:rPr lang="en-US" smtClean="0"/>
+              <a:pPr/>
               <a:t>1</a:t>
             </a:fld>
             <a:endParaRPr lang="en-US"/>
@@ -657,6 +661,124 @@
             </a:r>
           </a:p>
           <a:p>
+            <a:endParaRPr lang="en-US" dirty="0" smtClean="0"/>
+          </a:p>
+        </p:txBody>
+      </p:sp>
+      <p:sp>
+        <p:nvSpPr>
+          <p:cNvPr id="4" name="Slide Number Placeholder 3"/>
+          <p:cNvSpPr>
+            <a:spLocks noGrp="1"/>
+          </p:cNvSpPr>
+          <p:nvPr>
+            <p:ph type="sldNum" sz="quarter" idx="10"/>
+          </p:nvPr>
+        </p:nvSpPr>
+        <p:spPr/>
+        <p:txBody>
+          <a:bodyPr/>
+          <a:lstStyle/>
+          <a:p>
+            <a:fld id="{0912983F-8562-4131-A204-9294D774AF33}" type="slidenum">
+              <a:rPr lang="en-US" smtClean="0"/>
+              <a:pPr/>
+              <a:t>2</a:t>
+            </a:fld>
+            <a:endParaRPr lang="en-US"/>
+          </a:p>
+        </p:txBody>
+      </p:sp>
+    </p:spTree>
+  </p:cSld>
+  <p:clrMapOvr>
+    <a:masterClrMapping/>
+  </p:clrMapOvr>
+</p:notes>
+</file>
+
+<file path=ppt/notesSlides/notesSlide3.xml><?xml version="1.0" encoding="utf-8"?>
+<p:notes xmlns:a="http://schemas.openxmlformats.org/drawingml/2006/main" xmlns:r="http://schemas.openxmlformats.org/officeDocument/2006/relationships" xmlns:p="http://schemas.openxmlformats.org/presentationml/2006/main">
+  <p:cSld>
+    <p:spTree>
+      <p:nvGrpSpPr>
+        <p:cNvPr id="1" name=""/>
+        <p:cNvGrpSpPr/>
+        <p:nvPr/>
+      </p:nvGrpSpPr>
+      <p:grpSpPr>
+        <a:xfrm>
+          <a:off x="0" y="0"/>
+          <a:ext cx="0" cy="0"/>
+          <a:chOff x="0" y="0"/>
+          <a:chExt cx="0" cy="0"/>
+        </a:xfrm>
+      </p:grpSpPr>
+      <p:sp>
+        <p:nvSpPr>
+          <p:cNvPr id="2" name="Slide Image Placeholder 1"/>
+          <p:cNvSpPr>
+            <a:spLocks noGrp="1" noRot="1" noChangeAspect="1"/>
+          </p:cNvSpPr>
+          <p:nvPr>
+            <p:ph type="sldImg"/>
+          </p:nvPr>
+        </p:nvSpPr>
+        <p:spPr/>
+      </p:sp>
+      <p:sp>
+        <p:nvSpPr>
+          <p:cNvPr id="3" name="Notes Placeholder 2"/>
+          <p:cNvSpPr>
+            <a:spLocks noGrp="1"/>
+          </p:cNvSpPr>
+          <p:nvPr>
+            <p:ph type="body" idx="1"/>
+          </p:nvPr>
+        </p:nvSpPr>
+        <p:spPr/>
+        <p:txBody>
+          <a:bodyPr>
+            <a:normAutofit/>
+          </a:bodyPr>
+          <a:lstStyle/>
+          <a:p>
+            <a:r>
+              <a:rPr lang="en-US" dirty="0" smtClean="0"/>
+              <a:t>227,119,194 pink Golub</a:t>
+            </a:r>
+          </a:p>
+          <a:p>
+            <a:r>
+              <a:rPr lang="en-US" dirty="0" smtClean="0"/>
+              <a:t>255,127,14 orange Gray</a:t>
+            </a:r>
+          </a:p>
+          <a:p>
+            <a:r>
+              <a:rPr lang="en-US" dirty="0" smtClean="0"/>
+              <a:t>231,150,156 red Iyengar</a:t>
+            </a:r>
+          </a:p>
+          <a:p>
+            <a:r>
+              <a:rPr lang="en-US" dirty="0" smtClean="0"/>
+              <a:t>188,189,34 yellow Jaffe</a:t>
+            </a:r>
+          </a:p>
+          <a:p>
+            <a:r>
+              <a:rPr lang="en-US" dirty="0" smtClean="0"/>
+              <a:t>23,190,207 blue Sorger</a:t>
+            </a:r>
+          </a:p>
+          <a:p>
+            <a:r>
+              <a:rPr lang="en-US" dirty="0" smtClean="0"/>
+              <a:t>44,160,44 green Thompson</a:t>
+            </a:r>
+          </a:p>
+          <a:p>
             <a:endParaRPr lang="en-US" dirty="0"/>
           </a:p>
         </p:txBody>
@@ -678,7 +800,8 @@
           <a:p>
             <a:fld id="{0912983F-8562-4131-A204-9294D774AF33}" type="slidenum">
               <a:rPr lang="en-US" smtClean="0"/>
-              <a:t>2</a:t>
+              <a:pPr/>
+              <a:t>3</a:t>
             </a:fld>
             <a:endParaRPr lang="en-US"/>
           </a:p>
@@ -873,7 +996,8 @@
           <a:p>
             <a:fld id="{A9820ABC-862F-4517-8C39-A29940100223}" type="datetimeFigureOut">
               <a:rPr lang="en-US" smtClean="0"/>
-              <a:t>4/2/2015</a:t>
+              <a:pPr/>
+              <a:t>4/9/2015</a:t>
             </a:fld>
             <a:endParaRPr lang="en-US"/>
           </a:p>
@@ -915,6 +1039,7 @@
           <a:p>
             <a:fld id="{AF68BEA7-93DE-493C-BE3C-B16189161A93}" type="slidenum">
               <a:rPr lang="en-US" smtClean="0"/>
+              <a:pPr/>
               <a:t>‹#›</a:t>
             </a:fld>
             <a:endParaRPr lang="en-US"/>
@@ -1038,7 +1163,8 @@
           <a:p>
             <a:fld id="{A9820ABC-862F-4517-8C39-A29940100223}" type="datetimeFigureOut">
               <a:rPr lang="en-US" smtClean="0"/>
-              <a:t>4/2/2015</a:t>
+              <a:pPr/>
+              <a:t>4/9/2015</a:t>
             </a:fld>
             <a:endParaRPr lang="en-US"/>
           </a:p>
@@ -1080,6 +1206,7 @@
           <a:p>
             <a:fld id="{AF68BEA7-93DE-493C-BE3C-B16189161A93}" type="slidenum">
               <a:rPr lang="en-US" smtClean="0"/>
+              <a:pPr/>
               <a:t>‹#›</a:t>
             </a:fld>
             <a:endParaRPr lang="en-US"/>
@@ -1213,7 +1340,8 @@
           <a:p>
             <a:fld id="{A9820ABC-862F-4517-8C39-A29940100223}" type="datetimeFigureOut">
               <a:rPr lang="en-US" smtClean="0"/>
-              <a:t>4/2/2015</a:t>
+              <a:pPr/>
+              <a:t>4/9/2015</a:t>
             </a:fld>
             <a:endParaRPr lang="en-US"/>
           </a:p>
@@ -1255,6 +1383,7 @@
           <a:p>
             <a:fld id="{AF68BEA7-93DE-493C-BE3C-B16189161A93}" type="slidenum">
               <a:rPr lang="en-US" smtClean="0"/>
+              <a:pPr/>
               <a:t>‹#›</a:t>
             </a:fld>
             <a:endParaRPr lang="en-US"/>
@@ -1378,7 +1507,8 @@
           <a:p>
             <a:fld id="{A9820ABC-862F-4517-8C39-A29940100223}" type="datetimeFigureOut">
               <a:rPr lang="en-US" smtClean="0"/>
-              <a:t>4/2/2015</a:t>
+              <a:pPr/>
+              <a:t>4/9/2015</a:t>
             </a:fld>
             <a:endParaRPr lang="en-US"/>
           </a:p>
@@ -1420,6 +1550,7 @@
           <a:p>
             <a:fld id="{AF68BEA7-93DE-493C-BE3C-B16189161A93}" type="slidenum">
               <a:rPr lang="en-US" smtClean="0"/>
+              <a:pPr/>
               <a:t>‹#›</a:t>
             </a:fld>
             <a:endParaRPr lang="en-US"/>
@@ -1619,7 +1750,8 @@
           <a:p>
             <a:fld id="{A9820ABC-862F-4517-8C39-A29940100223}" type="datetimeFigureOut">
               <a:rPr lang="en-US" smtClean="0"/>
-              <a:t>4/2/2015</a:t>
+              <a:pPr/>
+              <a:t>4/9/2015</a:t>
             </a:fld>
             <a:endParaRPr lang="en-US"/>
           </a:p>
@@ -1661,6 +1793,7 @@
           <a:p>
             <a:fld id="{AF68BEA7-93DE-493C-BE3C-B16189161A93}" type="slidenum">
               <a:rPr lang="en-US" smtClean="0"/>
+              <a:pPr/>
               <a:t>‹#›</a:t>
             </a:fld>
             <a:endParaRPr lang="en-US"/>
@@ -1902,7 +2035,8 @@
           <a:p>
             <a:fld id="{A9820ABC-862F-4517-8C39-A29940100223}" type="datetimeFigureOut">
               <a:rPr lang="en-US" smtClean="0"/>
-              <a:t>4/2/2015</a:t>
+              <a:pPr/>
+              <a:t>4/9/2015</a:t>
             </a:fld>
             <a:endParaRPr lang="en-US"/>
           </a:p>
@@ -1944,6 +2078,7 @@
           <a:p>
             <a:fld id="{AF68BEA7-93DE-493C-BE3C-B16189161A93}" type="slidenum">
               <a:rPr lang="en-US" smtClean="0"/>
+              <a:pPr/>
               <a:t>‹#›</a:t>
             </a:fld>
             <a:endParaRPr lang="en-US"/>
@@ -2319,7 +2454,8 @@
           <a:p>
             <a:fld id="{A9820ABC-862F-4517-8C39-A29940100223}" type="datetimeFigureOut">
               <a:rPr lang="en-US" smtClean="0"/>
-              <a:t>4/2/2015</a:t>
+              <a:pPr/>
+              <a:t>4/9/2015</a:t>
             </a:fld>
             <a:endParaRPr lang="en-US"/>
           </a:p>
@@ -2361,6 +2497,7 @@
           <a:p>
             <a:fld id="{AF68BEA7-93DE-493C-BE3C-B16189161A93}" type="slidenum">
               <a:rPr lang="en-US" smtClean="0"/>
+              <a:pPr/>
               <a:t>‹#›</a:t>
             </a:fld>
             <a:endParaRPr lang="en-US"/>
@@ -2432,7 +2569,8 @@
           <a:p>
             <a:fld id="{A9820ABC-862F-4517-8C39-A29940100223}" type="datetimeFigureOut">
               <a:rPr lang="en-US" smtClean="0"/>
-              <a:t>4/2/2015</a:t>
+              <a:pPr/>
+              <a:t>4/9/2015</a:t>
             </a:fld>
             <a:endParaRPr lang="en-US"/>
           </a:p>
@@ -2474,6 +2612,7 @@
           <a:p>
             <a:fld id="{AF68BEA7-93DE-493C-BE3C-B16189161A93}" type="slidenum">
               <a:rPr lang="en-US" smtClean="0"/>
+              <a:pPr/>
               <a:t>‹#›</a:t>
             </a:fld>
             <a:endParaRPr lang="en-US"/>
@@ -2522,7 +2661,8 @@
           <a:p>
             <a:fld id="{A9820ABC-862F-4517-8C39-A29940100223}" type="datetimeFigureOut">
               <a:rPr lang="en-US" smtClean="0"/>
-              <a:t>4/2/2015</a:t>
+              <a:pPr/>
+              <a:t>4/9/2015</a:t>
             </a:fld>
             <a:endParaRPr lang="en-US"/>
           </a:p>
@@ -2564,6 +2704,7 @@
           <a:p>
             <a:fld id="{AF68BEA7-93DE-493C-BE3C-B16189161A93}" type="slidenum">
               <a:rPr lang="en-US" smtClean="0"/>
+              <a:pPr/>
               <a:t>‹#›</a:t>
             </a:fld>
             <a:endParaRPr lang="en-US"/>
@@ -2794,7 +2935,8 @@
           <a:p>
             <a:fld id="{A9820ABC-862F-4517-8C39-A29940100223}" type="datetimeFigureOut">
               <a:rPr lang="en-US" smtClean="0"/>
-              <a:t>4/2/2015</a:t>
+              <a:pPr/>
+              <a:t>4/9/2015</a:t>
             </a:fld>
             <a:endParaRPr lang="en-US"/>
           </a:p>
@@ -2836,6 +2978,7 @@
           <a:p>
             <a:fld id="{AF68BEA7-93DE-493C-BE3C-B16189161A93}" type="slidenum">
               <a:rPr lang="en-US" smtClean="0"/>
+              <a:pPr/>
               <a:t>‹#›</a:t>
             </a:fld>
             <a:endParaRPr lang="en-US"/>
@@ -3042,7 +3185,8 @@
           <a:p>
             <a:fld id="{A9820ABC-862F-4517-8C39-A29940100223}" type="datetimeFigureOut">
               <a:rPr lang="en-US" smtClean="0"/>
-              <a:t>4/2/2015</a:t>
+              <a:pPr/>
+              <a:t>4/9/2015</a:t>
             </a:fld>
             <a:endParaRPr lang="en-US"/>
           </a:p>
@@ -3084,6 +3228,7 @@
           <a:p>
             <a:fld id="{AF68BEA7-93DE-493C-BE3C-B16189161A93}" type="slidenum">
               <a:rPr lang="en-US" smtClean="0"/>
+              <a:pPr/>
               <a:t>‹#›</a:t>
             </a:fld>
             <a:endParaRPr lang="en-US"/>
@@ -3250,7 +3395,8 @@
           <a:p>
             <a:fld id="{A9820ABC-862F-4517-8C39-A29940100223}" type="datetimeFigureOut">
               <a:rPr lang="en-US" smtClean="0"/>
-              <a:t>4/2/2015</a:t>
+              <a:pPr/>
+              <a:t>4/9/2015</a:t>
             </a:fld>
             <a:endParaRPr lang="en-US"/>
           </a:p>
@@ -3328,6 +3474,7 @@
           <a:p>
             <a:fld id="{AF68BEA7-93DE-493C-BE3C-B16189161A93}" type="slidenum">
               <a:rPr lang="en-US" smtClean="0"/>
+              <a:pPr/>
               <a:t>‹#›</a:t>
             </a:fld>
             <a:endParaRPr lang="en-US"/>
@@ -3628,8 +3775,8 @@
         </p:nvSpPr>
         <p:spPr>
           <a:xfrm>
-            <a:off x="515470" y="4504730"/>
-            <a:ext cx="353568" cy="304800"/>
+            <a:off x="381000" y="4178863"/>
+            <a:ext cx="244851" cy="211078"/>
           </a:xfrm>
           <a:prstGeom prst="hexagon">
             <a:avLst/>
@@ -3662,7 +3809,7 @@
           <a:lstStyle/>
           <a:p>
             <a:pPr algn="ctr"/>
-            <a:endParaRPr lang="en-US"/>
+            <a:endParaRPr lang="en-US" sz="1600"/>
           </a:p>
         </p:txBody>
       </p:sp>
@@ -3674,8 +3821,8 @@
         </p:nvSpPr>
         <p:spPr>
           <a:xfrm>
-            <a:off x="4397727" y="4504730"/>
-            <a:ext cx="353568" cy="304800"/>
+            <a:off x="2590800" y="4178863"/>
+            <a:ext cx="244851" cy="211078"/>
           </a:xfrm>
           <a:prstGeom prst="hexagon">
             <a:avLst/>
@@ -3708,7 +3855,7 @@
           <a:lstStyle/>
           <a:p>
             <a:pPr algn="ctr"/>
-            <a:endParaRPr lang="en-US"/>
+            <a:endParaRPr lang="en-US" sz="1600"/>
           </a:p>
         </p:txBody>
       </p:sp>
@@ -3720,8 +3867,8 @@
         </p:nvSpPr>
         <p:spPr>
           <a:xfrm>
-            <a:off x="5468470" y="4504730"/>
-            <a:ext cx="353568" cy="304800"/>
+            <a:off x="4945375" y="4178863"/>
+            <a:ext cx="244851" cy="211078"/>
           </a:xfrm>
           <a:prstGeom prst="hexagon">
             <a:avLst/>
@@ -3754,7 +3901,7 @@
           <a:lstStyle/>
           <a:p>
             <a:pPr algn="ctr"/>
-            <a:endParaRPr lang="en-US"/>
+            <a:endParaRPr lang="en-US" sz="1600"/>
           </a:p>
         </p:txBody>
       </p:sp>
@@ -3766,8 +3913,8 @@
         </p:nvSpPr>
         <p:spPr>
           <a:xfrm>
-            <a:off x="2926975" y="4504730"/>
-            <a:ext cx="353568" cy="304800"/>
+            <a:off x="4040034" y="4178863"/>
+            <a:ext cx="244851" cy="211078"/>
           </a:xfrm>
           <a:prstGeom prst="hexagon">
             <a:avLst/>
@@ -3800,7 +3947,7 @@
           <a:lstStyle/>
           <a:p>
             <a:pPr algn="ctr"/>
-            <a:endParaRPr lang="en-US"/>
+            <a:endParaRPr lang="en-US" sz="1600"/>
           </a:p>
         </p:txBody>
       </p:sp>
@@ -3812,8 +3959,8 @@
         </p:nvSpPr>
         <p:spPr>
           <a:xfrm>
-            <a:off x="6781800" y="4504730"/>
-            <a:ext cx="353568" cy="304800"/>
+            <a:off x="6466802" y="4178863"/>
+            <a:ext cx="244851" cy="211078"/>
           </a:xfrm>
           <a:prstGeom prst="hexagon">
             <a:avLst/>
@@ -3846,7 +3993,7 @@
           <a:lstStyle/>
           <a:p>
             <a:pPr algn="ctr"/>
-            <a:endParaRPr lang="en-US"/>
+            <a:endParaRPr lang="en-US" sz="1600"/>
           </a:p>
         </p:txBody>
       </p:sp>
@@ -3858,8 +4005,8 @@
         </p:nvSpPr>
         <p:spPr>
           <a:xfrm>
-            <a:off x="1810870" y="4504730"/>
-            <a:ext cx="353568" cy="304800"/>
+            <a:off x="5751058" y="4178863"/>
+            <a:ext cx="244851" cy="211078"/>
           </a:xfrm>
           <a:prstGeom prst="hexagon">
             <a:avLst/>
@@ -3892,7 +4039,7 @@
           <a:lstStyle/>
           <a:p>
             <a:pPr algn="ctr"/>
-            <a:endParaRPr lang="en-US"/>
+            <a:endParaRPr lang="en-US" sz="1600"/>
           </a:p>
         </p:txBody>
       </p:sp>
@@ -3904,8 +4051,8 @@
         </p:nvSpPr>
         <p:spPr>
           <a:xfrm>
-            <a:off x="820270" y="4419600"/>
-            <a:ext cx="1008530" cy="461665"/>
+            <a:off x="446678" y="4114800"/>
+            <a:ext cx="2269090" cy="338554"/>
           </a:xfrm>
           <a:prstGeom prst="rect">
             <a:avLst/>
@@ -3918,11 +4065,16 @@
           </a:bodyPr>
           <a:lstStyle/>
           <a:p>
-            <a:r>
-              <a:rPr lang="en-US" sz="2400" dirty="0" smtClean="0"/>
-              <a:t>Golub</a:t>
-            </a:r>
-            <a:endParaRPr lang="en-US" sz="2400" dirty="0"/>
+            <a:pPr algn="ctr"/>
+            <a:r>
+              <a:rPr lang="en-US" sz="1600" dirty="0" smtClean="0"/>
+              <a:t>Broad-</a:t>
+            </a:r>
+            <a:r>
+              <a:rPr lang="en-US" sz="1600" dirty="0" err="1" smtClean="0"/>
+              <a:t>Transcriptomics</a:t>
+            </a:r>
+            <a:endParaRPr lang="en-US" sz="1600" dirty="0"/>
           </a:p>
         </p:txBody>
       </p:sp>
@@ -3934,8 +4086,8 @@
         </p:nvSpPr>
         <p:spPr>
           <a:xfrm>
-            <a:off x="4675095" y="4419600"/>
-            <a:ext cx="914400" cy="461665"/>
+            <a:off x="2756447" y="4114800"/>
+            <a:ext cx="1530317" cy="338554"/>
           </a:xfrm>
           <a:prstGeom prst="rect">
             <a:avLst/>
@@ -3949,10 +4101,10 @@
           <a:lstStyle/>
           <a:p>
             <a:r>
-              <a:rPr lang="en-US" sz="2400" dirty="0" smtClean="0"/>
-              <a:t>Jaffe</a:t>
-            </a:r>
-            <a:endParaRPr lang="en-US" sz="2400" dirty="0"/>
+              <a:rPr lang="en-US" sz="1600" dirty="0" smtClean="0"/>
+              <a:t>Broad-PCCSE</a:t>
+            </a:r>
+            <a:endParaRPr lang="en-US" sz="1600" dirty="0"/>
           </a:p>
         </p:txBody>
       </p:sp>
@@ -3964,8 +4116,8 @@
         </p:nvSpPr>
         <p:spPr>
           <a:xfrm>
-            <a:off x="5773270" y="4419600"/>
-            <a:ext cx="1066800" cy="461665"/>
+            <a:off x="5137252" y="4114800"/>
+            <a:ext cx="738774" cy="338554"/>
           </a:xfrm>
           <a:prstGeom prst="rect">
             <a:avLst/>
@@ -3979,10 +4131,10 @@
           <a:lstStyle/>
           <a:p>
             <a:r>
-              <a:rPr lang="en-US" sz="2400" dirty="0" smtClean="0"/>
-              <a:t>Sorger</a:t>
-            </a:r>
-            <a:endParaRPr lang="en-US" sz="2400" dirty="0"/>
+              <a:rPr lang="en-US" sz="1600" dirty="0" smtClean="0"/>
+              <a:t>HMS</a:t>
+            </a:r>
+            <a:endParaRPr lang="en-US" sz="1600" dirty="0"/>
           </a:p>
         </p:txBody>
       </p:sp>
@@ -3994,8 +4146,8 @@
         </p:nvSpPr>
         <p:spPr>
           <a:xfrm>
-            <a:off x="3231775" y="4419600"/>
-            <a:ext cx="1143000" cy="461665"/>
+            <a:off x="4229031" y="4114800"/>
+            <a:ext cx="791543" cy="338554"/>
           </a:xfrm>
           <a:prstGeom prst="rect">
             <a:avLst/>
@@ -4009,10 +4161,10 @@
           <a:lstStyle/>
           <a:p>
             <a:r>
-              <a:rPr lang="en-US" sz="2400" dirty="0" smtClean="0"/>
-              <a:t>Iyengar</a:t>
-            </a:r>
-            <a:endParaRPr lang="en-US" sz="2400" dirty="0"/>
+              <a:rPr lang="en-US" sz="1600" dirty="0" smtClean="0"/>
+              <a:t>DTOXS</a:t>
+            </a:r>
+            <a:endParaRPr lang="en-US" sz="1600" dirty="0"/>
           </a:p>
         </p:txBody>
       </p:sp>
@@ -4024,8 +4176,8 @@
         </p:nvSpPr>
         <p:spPr>
           <a:xfrm>
-            <a:off x="7086600" y="4419600"/>
-            <a:ext cx="1600200" cy="461665"/>
+            <a:off x="6634900" y="4114800"/>
+            <a:ext cx="1213700" cy="338554"/>
           </a:xfrm>
           <a:prstGeom prst="rect">
             <a:avLst/>
@@ -4039,10 +4191,10 @@
           <a:lstStyle/>
           <a:p>
             <a:r>
-              <a:rPr lang="en-US" sz="2400" dirty="0" smtClean="0"/>
-              <a:t>Thompson</a:t>
-            </a:r>
-            <a:endParaRPr lang="en-US" sz="2400" dirty="0"/>
+              <a:rPr lang="en-US" sz="1600" dirty="0" err="1" smtClean="0"/>
+              <a:t>NeuroLINCS</a:t>
+            </a:r>
+            <a:endParaRPr lang="en-US" sz="1600" dirty="0"/>
           </a:p>
         </p:txBody>
       </p:sp>
@@ -4054,8 +4206,8 @@
         </p:nvSpPr>
         <p:spPr>
           <a:xfrm>
-            <a:off x="2115670" y="4419600"/>
-            <a:ext cx="914400" cy="461665"/>
+            <a:off x="5919965" y="4114800"/>
+            <a:ext cx="633235" cy="338554"/>
           </a:xfrm>
           <a:prstGeom prst="rect">
             <a:avLst/>
@@ -4069,10 +4221,10 @@
           <a:lstStyle/>
           <a:p>
             <a:r>
-              <a:rPr lang="en-US" sz="2400" baseline="0" dirty="0" smtClean="0"/>
-              <a:t>Gray</a:t>
-            </a:r>
-            <a:endParaRPr lang="en-US" sz="2400" dirty="0"/>
+              <a:rPr lang="en-US" sz="1600" baseline="0" dirty="0" smtClean="0"/>
+              <a:t>MEP</a:t>
+            </a:r>
+            <a:endParaRPr lang="en-US" sz="1600" dirty="0"/>
           </a:p>
         </p:txBody>
       </p:sp>
@@ -4084,8 +4236,8 @@
         </p:nvSpPr>
         <p:spPr>
           <a:xfrm>
-            <a:off x="744070" y="5109865"/>
-            <a:ext cx="353568" cy="304800"/>
+            <a:off x="1219200" y="4520994"/>
+            <a:ext cx="244851" cy="211078"/>
           </a:xfrm>
           <a:prstGeom prst="triangle">
             <a:avLst/>
@@ -4120,7 +4272,7 @@
           <a:lstStyle/>
           <a:p>
             <a:pPr algn="ctr"/>
-            <a:endParaRPr lang="en-US"/>
+            <a:endParaRPr lang="en-US" sz="1600"/>
           </a:p>
         </p:txBody>
       </p:sp>
@@ -4132,8 +4284,8 @@
         </p:nvSpPr>
         <p:spPr>
           <a:xfrm>
-            <a:off x="5011270" y="5109865"/>
-            <a:ext cx="304800" cy="304800"/>
+            <a:off x="4191000" y="4520994"/>
+            <a:ext cx="211078" cy="211078"/>
           </a:xfrm>
           <a:prstGeom prst="rect">
             <a:avLst/>
@@ -4168,7 +4320,7 @@
           <a:lstStyle/>
           <a:p>
             <a:pPr algn="ctr"/>
-            <a:endParaRPr lang="en-US"/>
+            <a:endParaRPr lang="en-US" sz="1600"/>
           </a:p>
         </p:txBody>
       </p:sp>
@@ -4180,8 +4332,8 @@
         </p:nvSpPr>
         <p:spPr>
           <a:xfrm>
-            <a:off x="3106270" y="5109865"/>
-            <a:ext cx="304800" cy="304800"/>
+            <a:off x="2895600" y="4520994"/>
+            <a:ext cx="211078" cy="211078"/>
           </a:xfrm>
           <a:prstGeom prst="ellipse">
             <a:avLst/>
@@ -4216,7 +4368,7 @@
           <a:lstStyle/>
           <a:p>
             <a:pPr algn="ctr"/>
-            <a:endParaRPr lang="en-US"/>
+            <a:endParaRPr lang="en-US" sz="1600"/>
           </a:p>
         </p:txBody>
       </p:sp>
@@ -4228,8 +4380,8 @@
         </p:nvSpPr>
         <p:spPr>
           <a:xfrm>
-            <a:off x="6382870" y="5109865"/>
-            <a:ext cx="304800" cy="304800"/>
+            <a:off x="5123330" y="4520994"/>
+            <a:ext cx="211078" cy="211078"/>
           </a:xfrm>
           <a:prstGeom prst="diamond">
             <a:avLst/>
@@ -4264,7 +4416,7 @@
           <a:lstStyle/>
           <a:p>
             <a:pPr algn="ctr"/>
-            <a:endParaRPr lang="en-US"/>
+            <a:endParaRPr lang="en-US" sz="1600"/>
           </a:p>
         </p:txBody>
       </p:sp>
@@ -4276,8 +4428,8 @@
         </p:nvSpPr>
         <p:spPr>
           <a:xfrm>
-            <a:off x="1048870" y="5033665"/>
-            <a:ext cx="2057400" cy="461665"/>
+            <a:off x="1389530" y="4462046"/>
+            <a:ext cx="1424778" cy="338554"/>
           </a:xfrm>
           <a:prstGeom prst="rect">
             <a:avLst/>
@@ -4291,10 +4443,10 @@
           <a:lstStyle/>
           <a:p>
             <a:r>
-              <a:rPr lang="en-US" sz="2400" baseline="0" dirty="0" smtClean="0"/>
+              <a:rPr lang="en-US" sz="1600" baseline="0" dirty="0" smtClean="0"/>
               <a:t>Transcriptomic</a:t>
             </a:r>
-            <a:endParaRPr lang="en-US" sz="2400" dirty="0"/>
+            <a:endParaRPr lang="en-US" sz="1600" dirty="0"/>
           </a:p>
         </p:txBody>
       </p:sp>
@@ -4306,8 +4458,8 @@
         </p:nvSpPr>
         <p:spPr>
           <a:xfrm>
-            <a:off x="3411070" y="5033665"/>
-            <a:ext cx="1524000" cy="461665"/>
+            <a:off x="3065930" y="4462046"/>
+            <a:ext cx="1055391" cy="338554"/>
           </a:xfrm>
           <a:prstGeom prst="rect">
             <a:avLst/>
@@ -4321,10 +4473,10 @@
           <a:lstStyle/>
           <a:p>
             <a:r>
-              <a:rPr lang="en-US" sz="2400" baseline="0" dirty="0" smtClean="0"/>
+              <a:rPr lang="en-US" sz="1600" baseline="0" dirty="0" smtClean="0"/>
               <a:t>Proteomic</a:t>
             </a:r>
-            <a:endParaRPr lang="en-US" sz="2400" dirty="0"/>
+            <a:endParaRPr lang="en-US" sz="1600" dirty="0"/>
           </a:p>
         </p:txBody>
       </p:sp>
@@ -4336,8 +4488,8 @@
         </p:nvSpPr>
         <p:spPr>
           <a:xfrm>
-            <a:off x="5347445" y="5033665"/>
-            <a:ext cx="990600" cy="461665"/>
+            <a:off x="4361330" y="4462046"/>
+            <a:ext cx="900955" cy="338554"/>
           </a:xfrm>
           <a:prstGeom prst="rect">
             <a:avLst/>
@@ -4351,10 +4503,10 @@
           <a:lstStyle/>
           <a:p>
             <a:r>
-              <a:rPr lang="en-US" sz="2400" baseline="0" dirty="0" smtClean="0"/>
+              <a:rPr lang="en-US" sz="1600" baseline="0" dirty="0" smtClean="0"/>
               <a:t>Image</a:t>
             </a:r>
-            <a:endParaRPr lang="en-US" sz="2400" dirty="0"/>
+            <a:endParaRPr lang="en-US" sz="1600" dirty="0"/>
           </a:p>
         </p:txBody>
       </p:sp>
@@ -4366,8 +4518,8 @@
         </p:nvSpPr>
         <p:spPr>
           <a:xfrm>
-            <a:off x="6763870" y="5033665"/>
-            <a:ext cx="1676400" cy="461665"/>
+            <a:off x="5275730" y="4462046"/>
+            <a:ext cx="1160930" cy="338554"/>
           </a:xfrm>
           <a:prstGeom prst="rect">
             <a:avLst/>
@@ -4381,10 +4533,10 @@
           <a:lstStyle/>
           <a:p>
             <a:r>
-              <a:rPr lang="en-US" sz="2400" baseline="0" dirty="0" smtClean="0"/>
+              <a:rPr lang="en-US" sz="1600" baseline="0" dirty="0" smtClean="0"/>
               <a:t>Phenotypic</a:t>
             </a:r>
-            <a:endParaRPr lang="en-US" sz="2400" dirty="0"/>
+            <a:endParaRPr lang="en-US" sz="1600" dirty="0"/>
           </a:p>
         </p:txBody>
       </p:sp>
@@ -4393,6 +4545,13 @@
   <p:clrMapOvr>
     <a:masterClrMapping/>
   </p:clrMapOvr>
+  <p:timing>
+    <p:tnLst>
+      <p:par>
+        <p:cTn id="1" dur="indefinite" restart="never" nodeType="tmRoot"/>
+      </p:par>
+    </p:tnLst>
+  </p:timing>
 </p:sld>
 </file>
 
@@ -4421,8 +4580,8 @@
         </p:nvSpPr>
         <p:spPr>
           <a:xfrm>
-            <a:off x="820270" y="4419600"/>
-            <a:ext cx="1008530" cy="461665"/>
+            <a:off x="420800" y="4114800"/>
+            <a:ext cx="2269090" cy="338554"/>
           </a:xfrm>
           <a:prstGeom prst="rect">
             <a:avLst/>
@@ -4435,11 +4594,16 @@
           </a:bodyPr>
           <a:lstStyle/>
           <a:p>
-            <a:r>
-              <a:rPr lang="en-US" sz="2400" dirty="0" smtClean="0"/>
-              <a:t>Golub</a:t>
-            </a:r>
-            <a:endParaRPr lang="en-US" sz="2400" dirty="0"/>
+            <a:pPr algn="ctr"/>
+            <a:r>
+              <a:rPr lang="en-US" sz="1600" dirty="0" smtClean="0"/>
+              <a:t>Broad-</a:t>
+            </a:r>
+            <a:r>
+              <a:rPr lang="en-US" sz="1600" dirty="0" err="1" smtClean="0"/>
+              <a:t>Transcriptomics</a:t>
+            </a:r>
+            <a:endParaRPr lang="en-US" sz="1600" dirty="0"/>
           </a:p>
         </p:txBody>
       </p:sp>
@@ -4451,8 +4615,8 @@
         </p:nvSpPr>
         <p:spPr>
           <a:xfrm>
-            <a:off x="4675095" y="4419600"/>
-            <a:ext cx="914400" cy="461665"/>
+            <a:off x="2756447" y="4114800"/>
+            <a:ext cx="1530317" cy="338554"/>
           </a:xfrm>
           <a:prstGeom prst="rect">
             <a:avLst/>
@@ -4466,10 +4630,10 @@
           <a:lstStyle/>
           <a:p>
             <a:r>
-              <a:rPr lang="en-US" sz="2400" dirty="0" smtClean="0"/>
-              <a:t>Jaffe</a:t>
-            </a:r>
-            <a:endParaRPr lang="en-US" sz="2400" dirty="0"/>
+              <a:rPr lang="en-US" sz="1600" dirty="0" smtClean="0"/>
+              <a:t>Broad-PCCSE</a:t>
+            </a:r>
+            <a:endParaRPr lang="en-US" sz="1600" dirty="0"/>
           </a:p>
         </p:txBody>
       </p:sp>
@@ -4481,8 +4645,8 @@
         </p:nvSpPr>
         <p:spPr>
           <a:xfrm>
-            <a:off x="5773270" y="4419600"/>
-            <a:ext cx="1066800" cy="461665"/>
+            <a:off x="5163130" y="4114800"/>
+            <a:ext cx="577748" cy="338554"/>
           </a:xfrm>
           <a:prstGeom prst="rect">
             <a:avLst/>
@@ -4496,10 +4660,10 @@
           <a:lstStyle/>
           <a:p>
             <a:r>
-              <a:rPr lang="en-US" sz="2400" dirty="0" smtClean="0"/>
-              <a:t>Sorger</a:t>
-            </a:r>
-            <a:endParaRPr lang="en-US" sz="2400" dirty="0"/>
+              <a:rPr lang="en-US" sz="1600" dirty="0" smtClean="0"/>
+              <a:t>HMS</a:t>
+            </a:r>
+            <a:endParaRPr lang="en-US" sz="1600" dirty="0"/>
           </a:p>
         </p:txBody>
       </p:sp>
@@ -4511,8 +4675,8 @@
         </p:nvSpPr>
         <p:spPr>
           <a:xfrm>
-            <a:off x="3231775" y="4419600"/>
-            <a:ext cx="1143000" cy="461665"/>
+            <a:off x="4229031" y="4114800"/>
+            <a:ext cx="791543" cy="338554"/>
           </a:xfrm>
           <a:prstGeom prst="rect">
             <a:avLst/>
@@ -4526,23 +4690,23 @@
           <a:lstStyle/>
           <a:p>
             <a:r>
-              <a:rPr lang="en-US" sz="2400" dirty="0" smtClean="0"/>
-              <a:t>Iyengar</a:t>
-            </a:r>
-            <a:endParaRPr lang="en-US" sz="2400" dirty="0"/>
-          </a:p>
-        </p:txBody>
-      </p:sp>
-      <p:sp>
-        <p:nvSpPr>
-          <p:cNvPr id="14" name="TextBox 13"/>
+              <a:rPr lang="en-US" sz="1600" dirty="0" smtClean="0"/>
+              <a:t>DTOXS</a:t>
+            </a:r>
+            <a:endParaRPr lang="en-US" sz="1600" dirty="0"/>
+          </a:p>
+        </p:txBody>
+      </p:sp>
+      <p:sp>
+        <p:nvSpPr>
+          <p:cNvPr id="16" name="TextBox 15"/>
           <p:cNvSpPr txBox="1"/>
           <p:nvPr/>
         </p:nvSpPr>
         <p:spPr>
           <a:xfrm>
-            <a:off x="7086600" y="4419600"/>
-            <a:ext cx="1600200" cy="461665"/>
+            <a:off x="6693848" y="4114800"/>
+            <a:ext cx="1213700" cy="338554"/>
           </a:xfrm>
           <a:prstGeom prst="rect">
             <a:avLst/>
@@ -4556,23 +4720,23 @@
           <a:lstStyle/>
           <a:p>
             <a:r>
-              <a:rPr lang="en-US" sz="2400" dirty="0" smtClean="0"/>
-              <a:t>Thompson</a:t>
-            </a:r>
-            <a:endParaRPr lang="en-US" sz="2400" dirty="0"/>
-          </a:p>
-        </p:txBody>
-      </p:sp>
-      <p:sp>
-        <p:nvSpPr>
-          <p:cNvPr id="15" name="TextBox 14"/>
+              <a:rPr lang="en-US" sz="1600" dirty="0" err="1" smtClean="0"/>
+              <a:t>NeuroLINCS</a:t>
+            </a:r>
+            <a:endParaRPr lang="en-US" sz="1600" dirty="0"/>
+          </a:p>
+        </p:txBody>
+      </p:sp>
+      <p:sp>
+        <p:nvSpPr>
+          <p:cNvPr id="17" name="TextBox 16"/>
           <p:cNvSpPr txBox="1"/>
           <p:nvPr/>
         </p:nvSpPr>
         <p:spPr>
           <a:xfrm>
-            <a:off x="2115670" y="4419600"/>
-            <a:ext cx="914400" cy="461665"/>
+            <a:off x="5937217" y="4114800"/>
+            <a:ext cx="633235" cy="338554"/>
           </a:xfrm>
           <a:prstGeom prst="rect">
             <a:avLst/>
@@ -4586,34 +4750,34 @@
           <a:lstStyle/>
           <a:p>
             <a:r>
-              <a:rPr lang="en-US" sz="2400" baseline="0" dirty="0" smtClean="0"/>
-              <a:t>Gray</a:t>
-            </a:r>
-            <a:endParaRPr lang="en-US" sz="2400" dirty="0"/>
-          </a:p>
-        </p:txBody>
-      </p:sp>
-      <p:sp>
-        <p:nvSpPr>
-          <p:cNvPr id="16" name="Isosceles Triangle 15"/>
+              <a:rPr lang="en-US" sz="1600" baseline="0" dirty="0" smtClean="0"/>
+              <a:t>MEP</a:t>
+            </a:r>
+            <a:endParaRPr lang="en-US" sz="1600" dirty="0"/>
+          </a:p>
+        </p:txBody>
+      </p:sp>
+      <p:sp>
+        <p:nvSpPr>
+          <p:cNvPr id="18" name="Isosceles Triangle 17"/>
           <p:cNvSpPr/>
           <p:nvPr/>
         </p:nvSpPr>
         <p:spPr>
           <a:xfrm>
-            <a:off x="735444" y="5058109"/>
-            <a:ext cx="353568" cy="304800"/>
+            <a:off x="1219200" y="4520994"/>
+            <a:ext cx="244851" cy="211078"/>
           </a:xfrm>
           <a:prstGeom prst="triangle">
             <a:avLst/>
           </a:prstGeom>
-          <a:noFill/>
-          <a:ln w="44450">
-            <a:solidFill>
-              <a:schemeClr val="bg1">
-                <a:lumMod val="65000"/>
-              </a:schemeClr>
-            </a:solidFill>
+          <a:solidFill>
+            <a:schemeClr val="bg1">
+              <a:lumMod val="65000"/>
+            </a:schemeClr>
+          </a:solidFill>
+          <a:ln>
+            <a:noFill/>
           </a:ln>
         </p:spPr>
         <p:style>
@@ -4637,31 +4801,31 @@
           <a:lstStyle/>
           <a:p>
             <a:pPr algn="ctr"/>
-            <a:endParaRPr lang="en-US"/>
-          </a:p>
-        </p:txBody>
-      </p:sp>
-      <p:sp>
-        <p:nvSpPr>
-          <p:cNvPr id="17" name="Rectangle 16"/>
+            <a:endParaRPr lang="en-US" sz="1600"/>
+          </a:p>
+        </p:txBody>
+      </p:sp>
+      <p:sp>
+        <p:nvSpPr>
+          <p:cNvPr id="19" name="Rectangle 18"/>
           <p:cNvSpPr/>
           <p:nvPr/>
         </p:nvSpPr>
         <p:spPr>
           <a:xfrm>
-            <a:off x="5002644" y="5058109"/>
-            <a:ext cx="304800" cy="304800"/>
+            <a:off x="4191000" y="4520994"/>
+            <a:ext cx="211078" cy="211078"/>
           </a:xfrm>
           <a:prstGeom prst="rect">
             <a:avLst/>
           </a:prstGeom>
-          <a:noFill/>
-          <a:ln w="44450">
-            <a:solidFill>
-              <a:schemeClr val="bg1">
-                <a:lumMod val="65000"/>
-              </a:schemeClr>
-            </a:solidFill>
+          <a:solidFill>
+            <a:schemeClr val="bg1">
+              <a:lumMod val="65000"/>
+            </a:schemeClr>
+          </a:solidFill>
+          <a:ln>
+            <a:noFill/>
           </a:ln>
         </p:spPr>
         <p:style>
@@ -4685,31 +4849,31 @@
           <a:lstStyle/>
           <a:p>
             <a:pPr algn="ctr"/>
-            <a:endParaRPr lang="en-US"/>
-          </a:p>
-        </p:txBody>
-      </p:sp>
-      <p:sp>
-        <p:nvSpPr>
-          <p:cNvPr id="18" name="Oval 17"/>
+            <a:endParaRPr lang="en-US" sz="1600"/>
+          </a:p>
+        </p:txBody>
+      </p:sp>
+      <p:sp>
+        <p:nvSpPr>
+          <p:cNvPr id="20" name="Oval 19"/>
           <p:cNvSpPr/>
           <p:nvPr/>
         </p:nvSpPr>
         <p:spPr>
           <a:xfrm>
-            <a:off x="3097644" y="5058109"/>
-            <a:ext cx="304800" cy="304800"/>
+            <a:off x="2895600" y="4520994"/>
+            <a:ext cx="211078" cy="211078"/>
           </a:xfrm>
           <a:prstGeom prst="ellipse">
             <a:avLst/>
           </a:prstGeom>
-          <a:noFill/>
-          <a:ln w="44450">
-            <a:solidFill>
-              <a:schemeClr val="bg1">
-                <a:lumMod val="65000"/>
-              </a:schemeClr>
-            </a:solidFill>
+          <a:solidFill>
+            <a:schemeClr val="bg1">
+              <a:lumMod val="65000"/>
+            </a:schemeClr>
+          </a:solidFill>
+          <a:ln>
+            <a:noFill/>
           </a:ln>
         </p:spPr>
         <p:style>
@@ -4733,31 +4897,31 @@
           <a:lstStyle/>
           <a:p>
             <a:pPr algn="ctr"/>
-            <a:endParaRPr lang="en-US"/>
-          </a:p>
-        </p:txBody>
-      </p:sp>
-      <p:sp>
-        <p:nvSpPr>
-          <p:cNvPr id="19" name="Diamond 18"/>
+            <a:endParaRPr lang="en-US" sz="1600"/>
+          </a:p>
+        </p:txBody>
+      </p:sp>
+      <p:sp>
+        <p:nvSpPr>
+          <p:cNvPr id="21" name="Diamond 20"/>
           <p:cNvSpPr/>
           <p:nvPr/>
         </p:nvSpPr>
         <p:spPr>
           <a:xfrm>
-            <a:off x="6374244" y="5058109"/>
-            <a:ext cx="304800" cy="304800"/>
+            <a:off x="5123330" y="4520994"/>
+            <a:ext cx="211078" cy="211078"/>
           </a:xfrm>
           <a:prstGeom prst="diamond">
             <a:avLst/>
           </a:prstGeom>
-          <a:noFill/>
-          <a:ln w="44450">
-            <a:solidFill>
-              <a:schemeClr val="bg1">
-                <a:lumMod val="65000"/>
-              </a:schemeClr>
-            </a:solidFill>
+          <a:solidFill>
+            <a:schemeClr val="bg1">
+              <a:lumMod val="65000"/>
+            </a:schemeClr>
+          </a:solidFill>
+          <a:ln>
+            <a:noFill/>
           </a:ln>
         </p:spPr>
         <p:style>
@@ -4781,20 +4945,20 @@
           <a:lstStyle/>
           <a:p>
             <a:pPr algn="ctr"/>
-            <a:endParaRPr lang="en-US"/>
-          </a:p>
-        </p:txBody>
-      </p:sp>
-      <p:sp>
-        <p:nvSpPr>
-          <p:cNvPr id="20" name="TextBox 19"/>
+            <a:endParaRPr lang="en-US" sz="1600"/>
+          </a:p>
+        </p:txBody>
+      </p:sp>
+      <p:sp>
+        <p:nvSpPr>
+          <p:cNvPr id="22" name="TextBox 21"/>
           <p:cNvSpPr txBox="1"/>
           <p:nvPr/>
         </p:nvSpPr>
         <p:spPr>
           <a:xfrm>
-            <a:off x="1040244" y="4981909"/>
-            <a:ext cx="2057400" cy="461665"/>
+            <a:off x="1389530" y="4462046"/>
+            <a:ext cx="1424778" cy="338554"/>
           </a:xfrm>
           <a:prstGeom prst="rect">
             <a:avLst/>
@@ -4808,23 +4972,23 @@
           <a:lstStyle/>
           <a:p>
             <a:r>
-              <a:rPr lang="en-US" sz="2400" baseline="0" dirty="0" smtClean="0"/>
+              <a:rPr lang="en-US" sz="1600" baseline="0" dirty="0" smtClean="0"/>
               <a:t>Transcriptomic</a:t>
             </a:r>
-            <a:endParaRPr lang="en-US" sz="2400" dirty="0"/>
-          </a:p>
-        </p:txBody>
-      </p:sp>
-      <p:sp>
-        <p:nvSpPr>
-          <p:cNvPr id="21" name="TextBox 20"/>
+            <a:endParaRPr lang="en-US" sz="1600" dirty="0"/>
+          </a:p>
+        </p:txBody>
+      </p:sp>
+      <p:sp>
+        <p:nvSpPr>
+          <p:cNvPr id="24" name="TextBox 23"/>
           <p:cNvSpPr txBox="1"/>
           <p:nvPr/>
         </p:nvSpPr>
         <p:spPr>
           <a:xfrm>
-            <a:off x="3402444" y="4981909"/>
-            <a:ext cx="1524000" cy="461665"/>
+            <a:off x="3065930" y="4462046"/>
+            <a:ext cx="1055391" cy="338554"/>
           </a:xfrm>
           <a:prstGeom prst="rect">
             <a:avLst/>
@@ -4838,23 +5002,23 @@
           <a:lstStyle/>
           <a:p>
             <a:r>
-              <a:rPr lang="en-US" sz="2400" baseline="0" dirty="0" smtClean="0"/>
+              <a:rPr lang="en-US" sz="1600" baseline="0" dirty="0" smtClean="0"/>
               <a:t>Proteomic</a:t>
             </a:r>
-            <a:endParaRPr lang="en-US" sz="2400" dirty="0"/>
-          </a:p>
-        </p:txBody>
-      </p:sp>
-      <p:sp>
-        <p:nvSpPr>
-          <p:cNvPr id="22" name="TextBox 21"/>
+            <a:endParaRPr lang="en-US" sz="1600" dirty="0"/>
+          </a:p>
+        </p:txBody>
+      </p:sp>
+      <p:sp>
+        <p:nvSpPr>
+          <p:cNvPr id="26" name="TextBox 25"/>
           <p:cNvSpPr txBox="1"/>
           <p:nvPr/>
         </p:nvSpPr>
         <p:spPr>
           <a:xfrm>
-            <a:off x="5338819" y="4981909"/>
-            <a:ext cx="990600" cy="461665"/>
+            <a:off x="4361330" y="4462046"/>
+            <a:ext cx="900955" cy="338554"/>
           </a:xfrm>
           <a:prstGeom prst="rect">
             <a:avLst/>
@@ -4868,23 +5032,23 @@
           <a:lstStyle/>
           <a:p>
             <a:r>
-              <a:rPr lang="en-US" sz="2400" baseline="0" dirty="0" smtClean="0"/>
+              <a:rPr lang="en-US" sz="1600" baseline="0" dirty="0" smtClean="0"/>
               <a:t>Image</a:t>
             </a:r>
-            <a:endParaRPr lang="en-US" sz="2400" dirty="0"/>
-          </a:p>
-        </p:txBody>
-      </p:sp>
-      <p:sp>
-        <p:nvSpPr>
-          <p:cNvPr id="23" name="TextBox 22"/>
+            <a:endParaRPr lang="en-US" sz="1600" dirty="0"/>
+          </a:p>
+        </p:txBody>
+      </p:sp>
+      <p:sp>
+        <p:nvSpPr>
+          <p:cNvPr id="27" name="TextBox 26"/>
           <p:cNvSpPr txBox="1"/>
           <p:nvPr/>
         </p:nvSpPr>
         <p:spPr>
           <a:xfrm>
-            <a:off x="6755244" y="4981909"/>
-            <a:ext cx="1676400" cy="461665"/>
+            <a:off x="5275730" y="4462046"/>
+            <a:ext cx="1160930" cy="338554"/>
           </a:xfrm>
           <a:prstGeom prst="rect">
             <a:avLst/>
@@ -4898,22 +5062,22 @@
           <a:lstStyle/>
           <a:p>
             <a:r>
-              <a:rPr lang="en-US" sz="2400" baseline="0" dirty="0" smtClean="0"/>
+              <a:rPr lang="en-US" sz="1600" baseline="0" dirty="0" smtClean="0"/>
               <a:t>Phenotypic</a:t>
             </a:r>
-            <a:endParaRPr lang="en-US" sz="2400" dirty="0"/>
-          </a:p>
-        </p:txBody>
-      </p:sp>
-      <p:sp>
-        <p:nvSpPr>
-          <p:cNvPr id="24" name="Rectangle 23"/>
+            <a:endParaRPr lang="en-US" sz="1600" dirty="0"/>
+          </a:p>
+        </p:txBody>
+      </p:sp>
+      <p:sp>
+        <p:nvSpPr>
+          <p:cNvPr id="23" name="Rectangle 22"/>
           <p:cNvSpPr/>
           <p:nvPr/>
         </p:nvSpPr>
         <p:spPr>
           <a:xfrm>
-            <a:off x="533400" y="4627418"/>
+            <a:off x="278922" y="4232696"/>
             <a:ext cx="304800" cy="96982"/>
           </a:xfrm>
           <a:prstGeom prst="rect">
@@ -4959,7 +5123,7 @@
         </p:nvSpPr>
         <p:spPr>
           <a:xfrm>
-            <a:off x="1797627" y="4627418"/>
+            <a:off x="5690556" y="4232696"/>
             <a:ext cx="304800" cy="96982"/>
           </a:xfrm>
           <a:prstGeom prst="rect">
@@ -4999,13 +5163,13 @@
       </p:sp>
       <p:sp>
         <p:nvSpPr>
-          <p:cNvPr id="26" name="Rectangle 25"/>
+          <p:cNvPr id="28" name="Rectangle 27"/>
           <p:cNvSpPr/>
           <p:nvPr/>
         </p:nvSpPr>
         <p:spPr>
           <a:xfrm>
-            <a:off x="2895600" y="4627418"/>
+            <a:off x="3996904" y="4232696"/>
             <a:ext cx="304800" cy="96982"/>
           </a:xfrm>
           <a:prstGeom prst="rect">
@@ -5045,13 +5209,13 @@
       </p:sp>
       <p:sp>
         <p:nvSpPr>
-          <p:cNvPr id="27" name="Rectangle 26"/>
+          <p:cNvPr id="29" name="Rectangle 28"/>
           <p:cNvSpPr/>
           <p:nvPr/>
         </p:nvSpPr>
         <p:spPr>
           <a:xfrm>
-            <a:off x="4343400" y="4627418"/>
+            <a:off x="2531852" y="4232696"/>
             <a:ext cx="304800" cy="96982"/>
           </a:xfrm>
           <a:prstGeom prst="rect">
@@ -5091,13 +5255,13 @@
       </p:sp>
       <p:sp>
         <p:nvSpPr>
-          <p:cNvPr id="28" name="Rectangle 27"/>
+          <p:cNvPr id="30" name="Rectangle 29"/>
           <p:cNvSpPr/>
           <p:nvPr/>
         </p:nvSpPr>
         <p:spPr>
           <a:xfrm>
-            <a:off x="5410200" y="4627418"/>
+            <a:off x="4928556" y="4232696"/>
             <a:ext cx="304800" cy="96982"/>
           </a:xfrm>
           <a:prstGeom prst="rect">
@@ -5137,13 +5301,13 @@
       </p:sp>
       <p:sp>
         <p:nvSpPr>
-          <p:cNvPr id="29" name="Rectangle 28"/>
+          <p:cNvPr id="31" name="Rectangle 30"/>
           <p:cNvSpPr/>
           <p:nvPr/>
         </p:nvSpPr>
         <p:spPr>
           <a:xfrm>
-            <a:off x="6781800" y="4627418"/>
+            <a:off x="6468374" y="4232696"/>
             <a:ext cx="304800" cy="96982"/>
           </a:xfrm>
           <a:prstGeom prst="rect">
@@ -5186,6 +5350,813 @@
   <p:clrMapOvr>
     <a:masterClrMapping/>
   </p:clrMapOvr>
+  <p:timing>
+    <p:tnLst>
+      <p:par>
+        <p:cTn id="1" dur="indefinite" restart="never" nodeType="tmRoot"/>
+      </p:par>
+    </p:tnLst>
+  </p:timing>
+</p:sld>
+</file>
+
+<file path=ppt/slides/slide3.xml><?xml version="1.0" encoding="utf-8"?>
+<p:sld xmlns:a="http://schemas.openxmlformats.org/drawingml/2006/main" xmlns:r="http://schemas.openxmlformats.org/officeDocument/2006/relationships" xmlns:p="http://schemas.openxmlformats.org/presentationml/2006/main">
+  <p:cSld>
+    <p:spTree>
+      <p:nvGrpSpPr>
+        <p:cNvPr id="1" name=""/>
+        <p:cNvGrpSpPr/>
+        <p:nvPr/>
+      </p:nvGrpSpPr>
+      <p:grpSpPr>
+        <a:xfrm>
+          <a:off x="0" y="0"/>
+          <a:ext cx="0" cy="0"/>
+          <a:chOff x="0" y="0"/>
+          <a:chExt cx="0" cy="0"/>
+        </a:xfrm>
+      </p:grpSpPr>
+      <p:sp>
+        <p:nvSpPr>
+          <p:cNvPr id="10" name="TextBox 9"/>
+          <p:cNvSpPr txBox="1"/>
+          <p:nvPr/>
+        </p:nvSpPr>
+        <p:spPr>
+          <a:xfrm>
+            <a:off x="820270" y="4419600"/>
+            <a:ext cx="1008530" cy="461665"/>
+          </a:xfrm>
+          <a:prstGeom prst="rect">
+            <a:avLst/>
+          </a:prstGeom>
+          <a:noFill/>
+        </p:spPr>
+        <p:txBody>
+          <a:bodyPr wrap="square" rtlCol="0">
+            <a:spAutoFit/>
+          </a:bodyPr>
+          <a:lstStyle/>
+          <a:p>
+            <a:r>
+              <a:rPr lang="en-US" sz="2400" dirty="0" smtClean="0"/>
+              <a:t>Golub</a:t>
+            </a:r>
+            <a:endParaRPr lang="en-US" sz="2400" dirty="0"/>
+          </a:p>
+        </p:txBody>
+      </p:sp>
+      <p:sp>
+        <p:nvSpPr>
+          <p:cNvPr id="11" name="TextBox 10"/>
+          <p:cNvSpPr txBox="1"/>
+          <p:nvPr/>
+        </p:nvSpPr>
+        <p:spPr>
+          <a:xfrm>
+            <a:off x="4675095" y="4419600"/>
+            <a:ext cx="914400" cy="461665"/>
+          </a:xfrm>
+          <a:prstGeom prst="rect">
+            <a:avLst/>
+          </a:prstGeom>
+          <a:noFill/>
+        </p:spPr>
+        <p:txBody>
+          <a:bodyPr wrap="square" rtlCol="0">
+            <a:spAutoFit/>
+          </a:bodyPr>
+          <a:lstStyle/>
+          <a:p>
+            <a:r>
+              <a:rPr lang="en-US" sz="2400" dirty="0" smtClean="0"/>
+              <a:t>Jaffe</a:t>
+            </a:r>
+            <a:endParaRPr lang="en-US" sz="2400" dirty="0"/>
+          </a:p>
+        </p:txBody>
+      </p:sp>
+      <p:sp>
+        <p:nvSpPr>
+          <p:cNvPr id="12" name="TextBox 11"/>
+          <p:cNvSpPr txBox="1"/>
+          <p:nvPr/>
+        </p:nvSpPr>
+        <p:spPr>
+          <a:xfrm>
+            <a:off x="5773270" y="4419600"/>
+            <a:ext cx="1066800" cy="461665"/>
+          </a:xfrm>
+          <a:prstGeom prst="rect">
+            <a:avLst/>
+          </a:prstGeom>
+          <a:noFill/>
+        </p:spPr>
+        <p:txBody>
+          <a:bodyPr wrap="square" rtlCol="0">
+            <a:spAutoFit/>
+          </a:bodyPr>
+          <a:lstStyle/>
+          <a:p>
+            <a:r>
+              <a:rPr lang="en-US" sz="2400" dirty="0" smtClean="0"/>
+              <a:t>Sorger</a:t>
+            </a:r>
+            <a:endParaRPr lang="en-US" sz="2400" dirty="0"/>
+          </a:p>
+        </p:txBody>
+      </p:sp>
+      <p:sp>
+        <p:nvSpPr>
+          <p:cNvPr id="13" name="TextBox 12"/>
+          <p:cNvSpPr txBox="1"/>
+          <p:nvPr/>
+        </p:nvSpPr>
+        <p:spPr>
+          <a:xfrm>
+            <a:off x="3231775" y="4419600"/>
+            <a:ext cx="1143000" cy="461665"/>
+          </a:xfrm>
+          <a:prstGeom prst="rect">
+            <a:avLst/>
+          </a:prstGeom>
+          <a:noFill/>
+        </p:spPr>
+        <p:txBody>
+          <a:bodyPr wrap="square" rtlCol="0">
+            <a:spAutoFit/>
+          </a:bodyPr>
+          <a:lstStyle/>
+          <a:p>
+            <a:r>
+              <a:rPr lang="en-US" sz="2400" dirty="0" smtClean="0"/>
+              <a:t>Iyengar</a:t>
+            </a:r>
+            <a:endParaRPr lang="en-US" sz="2400" dirty="0"/>
+          </a:p>
+        </p:txBody>
+      </p:sp>
+      <p:sp>
+        <p:nvSpPr>
+          <p:cNvPr id="14" name="TextBox 13"/>
+          <p:cNvSpPr txBox="1"/>
+          <p:nvPr/>
+        </p:nvSpPr>
+        <p:spPr>
+          <a:xfrm>
+            <a:off x="7086600" y="4419600"/>
+            <a:ext cx="1600200" cy="461665"/>
+          </a:xfrm>
+          <a:prstGeom prst="rect">
+            <a:avLst/>
+          </a:prstGeom>
+          <a:noFill/>
+        </p:spPr>
+        <p:txBody>
+          <a:bodyPr wrap="square" rtlCol="0">
+            <a:spAutoFit/>
+          </a:bodyPr>
+          <a:lstStyle/>
+          <a:p>
+            <a:r>
+              <a:rPr lang="en-US" sz="2400" dirty="0" smtClean="0"/>
+              <a:t>Thompson</a:t>
+            </a:r>
+            <a:endParaRPr lang="en-US" sz="2400" dirty="0"/>
+          </a:p>
+        </p:txBody>
+      </p:sp>
+      <p:sp>
+        <p:nvSpPr>
+          <p:cNvPr id="15" name="TextBox 14"/>
+          <p:cNvSpPr txBox="1"/>
+          <p:nvPr/>
+        </p:nvSpPr>
+        <p:spPr>
+          <a:xfrm>
+            <a:off x="2115670" y="4419600"/>
+            <a:ext cx="914400" cy="461665"/>
+          </a:xfrm>
+          <a:prstGeom prst="rect">
+            <a:avLst/>
+          </a:prstGeom>
+          <a:noFill/>
+        </p:spPr>
+        <p:txBody>
+          <a:bodyPr wrap="square" rtlCol="0">
+            <a:spAutoFit/>
+          </a:bodyPr>
+          <a:lstStyle/>
+          <a:p>
+            <a:r>
+              <a:rPr lang="en-US" sz="2400" baseline="0" dirty="0" smtClean="0"/>
+              <a:t>Gray</a:t>
+            </a:r>
+            <a:endParaRPr lang="en-US" sz="2400" dirty="0"/>
+          </a:p>
+        </p:txBody>
+      </p:sp>
+      <p:sp>
+        <p:nvSpPr>
+          <p:cNvPr id="16" name="Isosceles Triangle 15"/>
+          <p:cNvSpPr/>
+          <p:nvPr/>
+        </p:nvSpPr>
+        <p:spPr>
+          <a:xfrm>
+            <a:off x="735444" y="5058109"/>
+            <a:ext cx="353568" cy="304800"/>
+          </a:xfrm>
+          <a:prstGeom prst="triangle">
+            <a:avLst/>
+          </a:prstGeom>
+          <a:noFill/>
+          <a:ln w="44450">
+            <a:solidFill>
+              <a:schemeClr val="bg1">
+                <a:lumMod val="65000"/>
+              </a:schemeClr>
+            </a:solidFill>
+          </a:ln>
+        </p:spPr>
+        <p:style>
+          <a:lnRef idx="2">
+            <a:schemeClr val="accent1">
+              <a:shade val="50000"/>
+            </a:schemeClr>
+          </a:lnRef>
+          <a:fillRef idx="1">
+            <a:schemeClr val="accent1"/>
+          </a:fillRef>
+          <a:effectRef idx="0">
+            <a:schemeClr val="accent1"/>
+          </a:effectRef>
+          <a:fontRef idx="minor">
+            <a:schemeClr val="lt1"/>
+          </a:fontRef>
+        </p:style>
+        <p:txBody>
+          <a:bodyPr rtlCol="0" anchor="ctr"/>
+          <a:lstStyle/>
+          <a:p>
+            <a:pPr algn="ctr"/>
+            <a:endParaRPr lang="en-US"/>
+          </a:p>
+        </p:txBody>
+      </p:sp>
+      <p:sp>
+        <p:nvSpPr>
+          <p:cNvPr id="17" name="Rectangle 16"/>
+          <p:cNvSpPr/>
+          <p:nvPr/>
+        </p:nvSpPr>
+        <p:spPr>
+          <a:xfrm>
+            <a:off x="5002644" y="5058109"/>
+            <a:ext cx="304800" cy="304800"/>
+          </a:xfrm>
+          <a:prstGeom prst="rect">
+            <a:avLst/>
+          </a:prstGeom>
+          <a:noFill/>
+          <a:ln w="44450">
+            <a:solidFill>
+              <a:schemeClr val="bg1">
+                <a:lumMod val="65000"/>
+              </a:schemeClr>
+            </a:solidFill>
+          </a:ln>
+        </p:spPr>
+        <p:style>
+          <a:lnRef idx="2">
+            <a:schemeClr val="accent1">
+              <a:shade val="50000"/>
+            </a:schemeClr>
+          </a:lnRef>
+          <a:fillRef idx="1">
+            <a:schemeClr val="accent1"/>
+          </a:fillRef>
+          <a:effectRef idx="0">
+            <a:schemeClr val="accent1"/>
+          </a:effectRef>
+          <a:fontRef idx="minor">
+            <a:schemeClr val="lt1"/>
+          </a:fontRef>
+        </p:style>
+        <p:txBody>
+          <a:bodyPr rtlCol="0" anchor="ctr"/>
+          <a:lstStyle/>
+          <a:p>
+            <a:pPr algn="ctr"/>
+            <a:endParaRPr lang="en-US"/>
+          </a:p>
+        </p:txBody>
+      </p:sp>
+      <p:sp>
+        <p:nvSpPr>
+          <p:cNvPr id="18" name="Oval 17"/>
+          <p:cNvSpPr/>
+          <p:nvPr/>
+        </p:nvSpPr>
+        <p:spPr>
+          <a:xfrm>
+            <a:off x="3097644" y="5058109"/>
+            <a:ext cx="304800" cy="304800"/>
+          </a:xfrm>
+          <a:prstGeom prst="ellipse">
+            <a:avLst/>
+          </a:prstGeom>
+          <a:noFill/>
+          <a:ln w="44450">
+            <a:solidFill>
+              <a:schemeClr val="bg1">
+                <a:lumMod val="65000"/>
+              </a:schemeClr>
+            </a:solidFill>
+          </a:ln>
+        </p:spPr>
+        <p:style>
+          <a:lnRef idx="2">
+            <a:schemeClr val="accent1">
+              <a:shade val="50000"/>
+            </a:schemeClr>
+          </a:lnRef>
+          <a:fillRef idx="1">
+            <a:schemeClr val="accent1"/>
+          </a:fillRef>
+          <a:effectRef idx="0">
+            <a:schemeClr val="accent1"/>
+          </a:effectRef>
+          <a:fontRef idx="minor">
+            <a:schemeClr val="lt1"/>
+          </a:fontRef>
+        </p:style>
+        <p:txBody>
+          <a:bodyPr rtlCol="0" anchor="ctr"/>
+          <a:lstStyle/>
+          <a:p>
+            <a:pPr algn="ctr"/>
+            <a:endParaRPr lang="en-US"/>
+          </a:p>
+        </p:txBody>
+      </p:sp>
+      <p:sp>
+        <p:nvSpPr>
+          <p:cNvPr id="19" name="Diamond 18"/>
+          <p:cNvSpPr/>
+          <p:nvPr/>
+        </p:nvSpPr>
+        <p:spPr>
+          <a:xfrm>
+            <a:off x="6374244" y="5058109"/>
+            <a:ext cx="304800" cy="304800"/>
+          </a:xfrm>
+          <a:prstGeom prst="diamond">
+            <a:avLst/>
+          </a:prstGeom>
+          <a:noFill/>
+          <a:ln w="44450">
+            <a:solidFill>
+              <a:schemeClr val="bg1">
+                <a:lumMod val="65000"/>
+              </a:schemeClr>
+            </a:solidFill>
+          </a:ln>
+        </p:spPr>
+        <p:style>
+          <a:lnRef idx="2">
+            <a:schemeClr val="accent1">
+              <a:shade val="50000"/>
+            </a:schemeClr>
+          </a:lnRef>
+          <a:fillRef idx="1">
+            <a:schemeClr val="accent1"/>
+          </a:fillRef>
+          <a:effectRef idx="0">
+            <a:schemeClr val="accent1"/>
+          </a:effectRef>
+          <a:fontRef idx="minor">
+            <a:schemeClr val="lt1"/>
+          </a:fontRef>
+        </p:style>
+        <p:txBody>
+          <a:bodyPr rtlCol="0" anchor="ctr"/>
+          <a:lstStyle/>
+          <a:p>
+            <a:pPr algn="ctr"/>
+            <a:endParaRPr lang="en-US"/>
+          </a:p>
+        </p:txBody>
+      </p:sp>
+      <p:sp>
+        <p:nvSpPr>
+          <p:cNvPr id="20" name="TextBox 19"/>
+          <p:cNvSpPr txBox="1"/>
+          <p:nvPr/>
+        </p:nvSpPr>
+        <p:spPr>
+          <a:xfrm>
+            <a:off x="1040244" y="4981909"/>
+            <a:ext cx="2057400" cy="461665"/>
+          </a:xfrm>
+          <a:prstGeom prst="rect">
+            <a:avLst/>
+          </a:prstGeom>
+          <a:noFill/>
+        </p:spPr>
+        <p:txBody>
+          <a:bodyPr wrap="square" rtlCol="0">
+            <a:spAutoFit/>
+          </a:bodyPr>
+          <a:lstStyle/>
+          <a:p>
+            <a:r>
+              <a:rPr lang="en-US" sz="2400" baseline="0" dirty="0" smtClean="0"/>
+              <a:t>Transcriptomic</a:t>
+            </a:r>
+            <a:endParaRPr lang="en-US" sz="2400" dirty="0"/>
+          </a:p>
+        </p:txBody>
+      </p:sp>
+      <p:sp>
+        <p:nvSpPr>
+          <p:cNvPr id="21" name="TextBox 20"/>
+          <p:cNvSpPr txBox="1"/>
+          <p:nvPr/>
+        </p:nvSpPr>
+        <p:spPr>
+          <a:xfrm>
+            <a:off x="3402444" y="4981909"/>
+            <a:ext cx="1524000" cy="461665"/>
+          </a:xfrm>
+          <a:prstGeom prst="rect">
+            <a:avLst/>
+          </a:prstGeom>
+          <a:noFill/>
+        </p:spPr>
+        <p:txBody>
+          <a:bodyPr wrap="square" rtlCol="0">
+            <a:spAutoFit/>
+          </a:bodyPr>
+          <a:lstStyle/>
+          <a:p>
+            <a:r>
+              <a:rPr lang="en-US" sz="2400" baseline="0" dirty="0" smtClean="0"/>
+              <a:t>Proteomic</a:t>
+            </a:r>
+            <a:endParaRPr lang="en-US" sz="2400" dirty="0"/>
+          </a:p>
+        </p:txBody>
+      </p:sp>
+      <p:sp>
+        <p:nvSpPr>
+          <p:cNvPr id="22" name="TextBox 21"/>
+          <p:cNvSpPr txBox="1"/>
+          <p:nvPr/>
+        </p:nvSpPr>
+        <p:spPr>
+          <a:xfrm>
+            <a:off x="5338819" y="4981909"/>
+            <a:ext cx="990600" cy="461665"/>
+          </a:xfrm>
+          <a:prstGeom prst="rect">
+            <a:avLst/>
+          </a:prstGeom>
+          <a:noFill/>
+        </p:spPr>
+        <p:txBody>
+          <a:bodyPr wrap="square" rtlCol="0">
+            <a:spAutoFit/>
+          </a:bodyPr>
+          <a:lstStyle/>
+          <a:p>
+            <a:r>
+              <a:rPr lang="en-US" sz="2400" baseline="0" dirty="0" smtClean="0"/>
+              <a:t>Image</a:t>
+            </a:r>
+            <a:endParaRPr lang="en-US" sz="2400" dirty="0"/>
+          </a:p>
+        </p:txBody>
+      </p:sp>
+      <p:sp>
+        <p:nvSpPr>
+          <p:cNvPr id="23" name="TextBox 22"/>
+          <p:cNvSpPr txBox="1"/>
+          <p:nvPr/>
+        </p:nvSpPr>
+        <p:spPr>
+          <a:xfrm>
+            <a:off x="6755244" y="4981909"/>
+            <a:ext cx="1676400" cy="461665"/>
+          </a:xfrm>
+          <a:prstGeom prst="rect">
+            <a:avLst/>
+          </a:prstGeom>
+          <a:noFill/>
+        </p:spPr>
+        <p:txBody>
+          <a:bodyPr wrap="square" rtlCol="0">
+            <a:spAutoFit/>
+          </a:bodyPr>
+          <a:lstStyle/>
+          <a:p>
+            <a:r>
+              <a:rPr lang="en-US" sz="2400" baseline="0" dirty="0" smtClean="0"/>
+              <a:t>Phenotypic</a:t>
+            </a:r>
+            <a:endParaRPr lang="en-US" sz="2400" dirty="0"/>
+          </a:p>
+        </p:txBody>
+      </p:sp>
+      <p:sp>
+        <p:nvSpPr>
+          <p:cNvPr id="24" name="Rectangle 23"/>
+          <p:cNvSpPr/>
+          <p:nvPr/>
+        </p:nvSpPr>
+        <p:spPr>
+          <a:xfrm>
+            <a:off x="533400" y="4627418"/>
+            <a:ext cx="304800" cy="96982"/>
+          </a:xfrm>
+          <a:prstGeom prst="rect">
+            <a:avLst/>
+          </a:prstGeom>
+          <a:solidFill>
+            <a:srgbClr val="E377C2"/>
+          </a:solidFill>
+          <a:ln>
+            <a:noFill/>
+          </a:ln>
+        </p:spPr>
+        <p:style>
+          <a:lnRef idx="2">
+            <a:schemeClr val="accent1">
+              <a:shade val="50000"/>
+            </a:schemeClr>
+          </a:lnRef>
+          <a:fillRef idx="1">
+            <a:schemeClr val="accent1"/>
+          </a:fillRef>
+          <a:effectRef idx="0">
+            <a:schemeClr val="accent1"/>
+          </a:effectRef>
+          <a:fontRef idx="minor">
+            <a:schemeClr val="lt1"/>
+          </a:fontRef>
+        </p:style>
+        <p:txBody>
+          <a:bodyPr rtlCol="0" anchor="ctr"/>
+          <a:lstStyle/>
+          <a:p>
+            <a:pPr algn="ctr"/>
+            <a:endParaRPr lang="en-US"/>
+          </a:p>
+        </p:txBody>
+      </p:sp>
+      <p:sp>
+        <p:nvSpPr>
+          <p:cNvPr id="25" name="Rectangle 24"/>
+          <p:cNvSpPr/>
+          <p:nvPr/>
+        </p:nvSpPr>
+        <p:spPr>
+          <a:xfrm>
+            <a:off x="1797627" y="4627418"/>
+            <a:ext cx="304800" cy="96982"/>
+          </a:xfrm>
+          <a:prstGeom prst="rect">
+            <a:avLst/>
+          </a:prstGeom>
+          <a:solidFill>
+            <a:srgbClr val="FF7F0E"/>
+          </a:solidFill>
+          <a:ln>
+            <a:noFill/>
+          </a:ln>
+        </p:spPr>
+        <p:style>
+          <a:lnRef idx="2">
+            <a:schemeClr val="accent1">
+              <a:shade val="50000"/>
+            </a:schemeClr>
+          </a:lnRef>
+          <a:fillRef idx="1">
+            <a:schemeClr val="accent1"/>
+          </a:fillRef>
+          <a:effectRef idx="0">
+            <a:schemeClr val="accent1"/>
+          </a:effectRef>
+          <a:fontRef idx="minor">
+            <a:schemeClr val="lt1"/>
+          </a:fontRef>
+        </p:style>
+        <p:txBody>
+          <a:bodyPr rtlCol="0" anchor="ctr"/>
+          <a:lstStyle/>
+          <a:p>
+            <a:pPr algn="ctr"/>
+            <a:endParaRPr lang="en-US"/>
+          </a:p>
+        </p:txBody>
+      </p:sp>
+      <p:sp>
+        <p:nvSpPr>
+          <p:cNvPr id="26" name="Rectangle 25"/>
+          <p:cNvSpPr/>
+          <p:nvPr/>
+        </p:nvSpPr>
+        <p:spPr>
+          <a:xfrm>
+            <a:off x="2895600" y="4627418"/>
+            <a:ext cx="304800" cy="96982"/>
+          </a:xfrm>
+          <a:prstGeom prst="rect">
+            <a:avLst/>
+          </a:prstGeom>
+          <a:solidFill>
+            <a:srgbClr val="E7969C"/>
+          </a:solidFill>
+          <a:ln>
+            <a:noFill/>
+          </a:ln>
+        </p:spPr>
+        <p:style>
+          <a:lnRef idx="2">
+            <a:schemeClr val="accent1">
+              <a:shade val="50000"/>
+            </a:schemeClr>
+          </a:lnRef>
+          <a:fillRef idx="1">
+            <a:schemeClr val="accent1"/>
+          </a:fillRef>
+          <a:effectRef idx="0">
+            <a:schemeClr val="accent1"/>
+          </a:effectRef>
+          <a:fontRef idx="minor">
+            <a:schemeClr val="lt1"/>
+          </a:fontRef>
+        </p:style>
+        <p:txBody>
+          <a:bodyPr rtlCol="0" anchor="ctr"/>
+          <a:lstStyle/>
+          <a:p>
+            <a:pPr algn="ctr"/>
+            <a:endParaRPr lang="en-US"/>
+          </a:p>
+        </p:txBody>
+      </p:sp>
+      <p:sp>
+        <p:nvSpPr>
+          <p:cNvPr id="27" name="Rectangle 26"/>
+          <p:cNvSpPr/>
+          <p:nvPr/>
+        </p:nvSpPr>
+        <p:spPr>
+          <a:xfrm>
+            <a:off x="4343400" y="4627418"/>
+            <a:ext cx="304800" cy="96982"/>
+          </a:xfrm>
+          <a:prstGeom prst="rect">
+            <a:avLst/>
+          </a:prstGeom>
+          <a:solidFill>
+            <a:srgbClr val="BCBD22"/>
+          </a:solidFill>
+          <a:ln>
+            <a:noFill/>
+          </a:ln>
+        </p:spPr>
+        <p:style>
+          <a:lnRef idx="2">
+            <a:schemeClr val="accent1">
+              <a:shade val="50000"/>
+            </a:schemeClr>
+          </a:lnRef>
+          <a:fillRef idx="1">
+            <a:schemeClr val="accent1"/>
+          </a:fillRef>
+          <a:effectRef idx="0">
+            <a:schemeClr val="accent1"/>
+          </a:effectRef>
+          <a:fontRef idx="minor">
+            <a:schemeClr val="lt1"/>
+          </a:fontRef>
+        </p:style>
+        <p:txBody>
+          <a:bodyPr rtlCol="0" anchor="ctr"/>
+          <a:lstStyle/>
+          <a:p>
+            <a:pPr algn="ctr"/>
+            <a:endParaRPr lang="en-US"/>
+          </a:p>
+        </p:txBody>
+      </p:sp>
+      <p:sp>
+        <p:nvSpPr>
+          <p:cNvPr id="28" name="Rectangle 27"/>
+          <p:cNvSpPr/>
+          <p:nvPr/>
+        </p:nvSpPr>
+        <p:spPr>
+          <a:xfrm>
+            <a:off x="5410200" y="4627418"/>
+            <a:ext cx="304800" cy="96982"/>
+          </a:xfrm>
+          <a:prstGeom prst="rect">
+            <a:avLst/>
+          </a:prstGeom>
+          <a:solidFill>
+            <a:srgbClr val="17BECF"/>
+          </a:solidFill>
+          <a:ln>
+            <a:noFill/>
+          </a:ln>
+        </p:spPr>
+        <p:style>
+          <a:lnRef idx="2">
+            <a:schemeClr val="accent1">
+              <a:shade val="50000"/>
+            </a:schemeClr>
+          </a:lnRef>
+          <a:fillRef idx="1">
+            <a:schemeClr val="accent1"/>
+          </a:fillRef>
+          <a:effectRef idx="0">
+            <a:schemeClr val="accent1"/>
+          </a:effectRef>
+          <a:fontRef idx="minor">
+            <a:schemeClr val="lt1"/>
+          </a:fontRef>
+        </p:style>
+        <p:txBody>
+          <a:bodyPr rtlCol="0" anchor="ctr"/>
+          <a:lstStyle/>
+          <a:p>
+            <a:pPr algn="ctr"/>
+            <a:endParaRPr lang="en-US"/>
+          </a:p>
+        </p:txBody>
+      </p:sp>
+      <p:sp>
+        <p:nvSpPr>
+          <p:cNvPr id="29" name="Rectangle 28"/>
+          <p:cNvSpPr/>
+          <p:nvPr/>
+        </p:nvSpPr>
+        <p:spPr>
+          <a:xfrm>
+            <a:off x="6781800" y="4627418"/>
+            <a:ext cx="304800" cy="96982"/>
+          </a:xfrm>
+          <a:prstGeom prst="rect">
+            <a:avLst/>
+          </a:prstGeom>
+          <a:solidFill>
+            <a:srgbClr val="2CA02C"/>
+          </a:solidFill>
+          <a:ln>
+            <a:noFill/>
+          </a:ln>
+        </p:spPr>
+        <p:style>
+          <a:lnRef idx="2">
+            <a:schemeClr val="accent1">
+              <a:shade val="50000"/>
+            </a:schemeClr>
+          </a:lnRef>
+          <a:fillRef idx="1">
+            <a:schemeClr val="accent1"/>
+          </a:fillRef>
+          <a:effectRef idx="0">
+            <a:schemeClr val="accent1"/>
+          </a:effectRef>
+          <a:fontRef idx="minor">
+            <a:schemeClr val="lt1"/>
+          </a:fontRef>
+        </p:style>
+        <p:txBody>
+          <a:bodyPr rtlCol="0" anchor="ctr"/>
+          <a:lstStyle/>
+          <a:p>
+            <a:pPr algn="ctr"/>
+            <a:endParaRPr lang="en-US"/>
+          </a:p>
+        </p:txBody>
+      </p:sp>
+    </p:spTree>
+  </p:cSld>
+  <p:clrMapOvr>
+    <a:masterClrMapping/>
+  </p:clrMapOvr>
+  <p:timing>
+    <p:tnLst>
+      <p:par>
+        <p:cTn id="1" dur="indefinite" restart="never" nodeType="tmRoot"/>
+      </p:par>
+    </p:tnLst>
+  </p:timing>
 </p:sld>
 </file>
 

</xml_diff>

<commit_message>
update type legend text
</commit_message>
<xml_diff>
--- a/app/public/css/img/legend.pptx
+++ b/app/public/css/img/legend.pptx
@@ -195,7 +195,7 @@
             <a:fld id="{BB031649-C5D4-4975-9118-257A744452E7}" type="datetimeFigureOut">
               <a:rPr lang="en-US" smtClean="0"/>
               <a:pPr/>
-              <a:t>4/9/2015</a:t>
+              <a:t>4/29/2015</a:t>
             </a:fld>
             <a:endParaRPr lang="en-US"/>
           </a:p>
@@ -997,7 +997,7 @@
             <a:fld id="{A9820ABC-862F-4517-8C39-A29940100223}" type="datetimeFigureOut">
               <a:rPr lang="en-US" smtClean="0"/>
               <a:pPr/>
-              <a:t>4/9/2015</a:t>
+              <a:t>4/29/2015</a:t>
             </a:fld>
             <a:endParaRPr lang="en-US"/>
           </a:p>
@@ -1164,7 +1164,7 @@
             <a:fld id="{A9820ABC-862F-4517-8C39-A29940100223}" type="datetimeFigureOut">
               <a:rPr lang="en-US" smtClean="0"/>
               <a:pPr/>
-              <a:t>4/9/2015</a:t>
+              <a:t>4/29/2015</a:t>
             </a:fld>
             <a:endParaRPr lang="en-US"/>
           </a:p>
@@ -1341,7 +1341,7 @@
             <a:fld id="{A9820ABC-862F-4517-8C39-A29940100223}" type="datetimeFigureOut">
               <a:rPr lang="en-US" smtClean="0"/>
               <a:pPr/>
-              <a:t>4/9/2015</a:t>
+              <a:t>4/29/2015</a:t>
             </a:fld>
             <a:endParaRPr lang="en-US"/>
           </a:p>
@@ -1508,7 +1508,7 @@
             <a:fld id="{A9820ABC-862F-4517-8C39-A29940100223}" type="datetimeFigureOut">
               <a:rPr lang="en-US" smtClean="0"/>
               <a:pPr/>
-              <a:t>4/9/2015</a:t>
+              <a:t>4/29/2015</a:t>
             </a:fld>
             <a:endParaRPr lang="en-US"/>
           </a:p>
@@ -1751,7 +1751,7 @@
             <a:fld id="{A9820ABC-862F-4517-8C39-A29940100223}" type="datetimeFigureOut">
               <a:rPr lang="en-US" smtClean="0"/>
               <a:pPr/>
-              <a:t>4/9/2015</a:t>
+              <a:t>4/29/2015</a:t>
             </a:fld>
             <a:endParaRPr lang="en-US"/>
           </a:p>
@@ -2036,7 +2036,7 @@
             <a:fld id="{A9820ABC-862F-4517-8C39-A29940100223}" type="datetimeFigureOut">
               <a:rPr lang="en-US" smtClean="0"/>
               <a:pPr/>
-              <a:t>4/9/2015</a:t>
+              <a:t>4/29/2015</a:t>
             </a:fld>
             <a:endParaRPr lang="en-US"/>
           </a:p>
@@ -2455,7 +2455,7 @@
             <a:fld id="{A9820ABC-862F-4517-8C39-A29940100223}" type="datetimeFigureOut">
               <a:rPr lang="en-US" smtClean="0"/>
               <a:pPr/>
-              <a:t>4/9/2015</a:t>
+              <a:t>4/29/2015</a:t>
             </a:fld>
             <a:endParaRPr lang="en-US"/>
           </a:p>
@@ -2570,7 +2570,7 @@
             <a:fld id="{A9820ABC-862F-4517-8C39-A29940100223}" type="datetimeFigureOut">
               <a:rPr lang="en-US" smtClean="0"/>
               <a:pPr/>
-              <a:t>4/9/2015</a:t>
+              <a:t>4/29/2015</a:t>
             </a:fld>
             <a:endParaRPr lang="en-US"/>
           </a:p>
@@ -2662,7 +2662,7 @@
             <a:fld id="{A9820ABC-862F-4517-8C39-A29940100223}" type="datetimeFigureOut">
               <a:rPr lang="en-US" smtClean="0"/>
               <a:pPr/>
-              <a:t>4/9/2015</a:t>
+              <a:t>4/29/2015</a:t>
             </a:fld>
             <a:endParaRPr lang="en-US"/>
           </a:p>
@@ -2936,7 +2936,7 @@
             <a:fld id="{A9820ABC-862F-4517-8C39-A29940100223}" type="datetimeFigureOut">
               <a:rPr lang="en-US" smtClean="0"/>
               <a:pPr/>
-              <a:t>4/9/2015</a:t>
+              <a:t>4/29/2015</a:t>
             </a:fld>
             <a:endParaRPr lang="en-US"/>
           </a:p>
@@ -3186,7 +3186,7 @@
             <a:fld id="{A9820ABC-862F-4517-8C39-A29940100223}" type="datetimeFigureOut">
               <a:rPr lang="en-US" smtClean="0"/>
               <a:pPr/>
-              <a:t>4/9/2015</a:t>
+              <a:t>4/29/2015</a:t>
             </a:fld>
             <a:endParaRPr lang="en-US"/>
           </a:p>
@@ -3396,7 +3396,7 @@
             <a:fld id="{A9820ABC-862F-4517-8C39-A29940100223}" type="datetimeFigureOut">
               <a:rPr lang="en-US" smtClean="0"/>
               <a:pPr/>
-              <a:t>4/9/2015</a:t>
+              <a:t>4/29/2015</a:t>
             </a:fld>
             <a:endParaRPr lang="en-US"/>
           </a:p>
@@ -5565,7 +5565,7 @@
         </p:nvSpPr>
         <p:spPr>
           <a:xfrm>
-            <a:off x="735444" y="5058109"/>
+            <a:off x="583044" y="5058109"/>
             <a:ext cx="353568" cy="304800"/>
           </a:xfrm>
           <a:prstGeom prst="triangle">
@@ -5613,7 +5613,7 @@
         </p:nvSpPr>
         <p:spPr>
           <a:xfrm>
-            <a:off x="5002644" y="5058109"/>
+            <a:off x="5029200" y="5058109"/>
             <a:ext cx="304800" cy="304800"/>
           </a:xfrm>
           <a:prstGeom prst="rect">
@@ -5661,7 +5661,7 @@
         </p:nvSpPr>
         <p:spPr>
           <a:xfrm>
-            <a:off x="3097644" y="5058109"/>
+            <a:off x="3063140" y="5058109"/>
             <a:ext cx="304800" cy="304800"/>
           </a:xfrm>
           <a:prstGeom prst="ellipse">
@@ -5709,7 +5709,7 @@
         </p:nvSpPr>
         <p:spPr>
           <a:xfrm>
-            <a:off x="6374244" y="5058109"/>
+            <a:off x="6553200" y="5058109"/>
             <a:ext cx="304800" cy="304800"/>
           </a:xfrm>
           <a:prstGeom prst="diamond">
@@ -5757,8 +5757,8 @@
         </p:nvSpPr>
         <p:spPr>
           <a:xfrm>
-            <a:off x="1040244" y="4981909"/>
-            <a:ext cx="2057400" cy="461665"/>
+            <a:off x="887844" y="4981909"/>
+            <a:ext cx="2160156" cy="461665"/>
           </a:xfrm>
           <a:prstGeom prst="rect">
             <a:avLst/>
@@ -5773,7 +5773,7 @@
           <a:p>
             <a:r>
               <a:rPr lang="en-US" sz="2400" baseline="0" dirty="0" smtClean="0"/>
-              <a:t>Transcriptomic</a:t>
+              <a:t>Transcriptomics</a:t>
             </a:r>
             <a:endParaRPr lang="en-US" sz="2400" dirty="0"/>
           </a:p>
@@ -5787,8 +5787,8 @@
         </p:nvSpPr>
         <p:spPr>
           <a:xfrm>
-            <a:off x="3402444" y="4981909"/>
-            <a:ext cx="1524000" cy="461665"/>
+            <a:off x="3367940" y="4981909"/>
+            <a:ext cx="1702956" cy="461665"/>
           </a:xfrm>
           <a:prstGeom prst="rect">
             <a:avLst/>
@@ -5803,7 +5803,7 @@
           <a:p>
             <a:r>
               <a:rPr lang="en-US" sz="2400" baseline="0" dirty="0" smtClean="0"/>
-              <a:t>Proteomic</a:t>
+              <a:t>Proteomics</a:t>
             </a:r>
             <a:endParaRPr lang="en-US" sz="2400" dirty="0"/>
           </a:p>
@@ -5817,8 +5817,8 @@
         </p:nvSpPr>
         <p:spPr>
           <a:xfrm>
-            <a:off x="5338819" y="4981909"/>
-            <a:ext cx="990600" cy="461665"/>
+            <a:off x="5310233" y="4981909"/>
+            <a:ext cx="1290581" cy="461665"/>
           </a:xfrm>
           <a:prstGeom prst="rect">
             <a:avLst/>
@@ -5833,7 +5833,7 @@
           <a:p>
             <a:r>
               <a:rPr lang="en-US" sz="2400" baseline="0" dirty="0" smtClean="0"/>
-              <a:t>Image</a:t>
+              <a:t>Imaging</a:t>
             </a:r>
             <a:endParaRPr lang="en-US" sz="2400" dirty="0"/>
           </a:p>
@@ -5847,7 +5847,7 @@
         </p:nvSpPr>
         <p:spPr>
           <a:xfrm>
-            <a:off x="6755244" y="4981909"/>
+            <a:off x="6858000" y="4981909"/>
             <a:ext cx="1676400" cy="461665"/>
           </a:xfrm>
           <a:prstGeom prst="rect">
@@ -5863,7 +5863,7 @@
           <a:p>
             <a:r>
               <a:rPr lang="en-US" sz="2400" baseline="0" dirty="0" smtClean="0"/>
-              <a:t>Phenotypic</a:t>
+              <a:t>Phenotypes</a:t>
             </a:r>
             <a:endParaRPr lang="en-US" sz="2400" dirty="0"/>
           </a:p>

</xml_diff>